<commit_message>
Get BLE fsr values to appear on homeViewController
</commit_message>
<xml_diff>
--- a/FSR_Read GATT Table.pptx
+++ b/FSR_Read GATT Table.pptx
@@ -105,6 +105,11 @@
       </a:defRPr>
     </a:lvl9pPr>
   </p:defaultTextStyle>
+  <p:extLst>
+    <p:ext uri="{EFAFB233-063F-42B5-8137-9DF3F51BA10A}">
+      <p15:sldGuideLst xmlns:p15="http://schemas.microsoft.com/office/powerpoint/2012/main"/>
+    </p:ext>
+  </p:extLst>
 </p:presentation>
 </file>
 
@@ -239,7 +244,7 @@
           <a:p>
             <a:fld id="{25FCA107-4A46-354A-A02E-D5DEC74A159E}" type="datetimeFigureOut">
               <a:rPr lang="en-US" smtClean="0"/>
-              <a:t>2/9/18</a:t>
+              <a:t>3/22/18</a:t>
             </a:fld>
             <a:endParaRPr lang="en-US"/>
           </a:p>
@@ -404,7 +409,7 @@
           <a:p>
             <a:fld id="{25FCA107-4A46-354A-A02E-D5DEC74A159E}" type="datetimeFigureOut">
               <a:rPr lang="en-US" smtClean="0"/>
-              <a:t>2/9/18</a:t>
+              <a:t>3/22/18</a:t>
             </a:fld>
             <a:endParaRPr lang="en-US"/>
           </a:p>
@@ -579,7 +584,7 @@
           <a:p>
             <a:fld id="{25FCA107-4A46-354A-A02E-D5DEC74A159E}" type="datetimeFigureOut">
               <a:rPr lang="en-US" smtClean="0"/>
-              <a:t>2/9/18</a:t>
+              <a:t>3/22/18</a:t>
             </a:fld>
             <a:endParaRPr lang="en-US"/>
           </a:p>
@@ -744,7 +749,7 @@
           <a:p>
             <a:fld id="{25FCA107-4A46-354A-A02E-D5DEC74A159E}" type="datetimeFigureOut">
               <a:rPr lang="en-US" smtClean="0"/>
-              <a:t>2/9/18</a:t>
+              <a:t>3/22/18</a:t>
             </a:fld>
             <a:endParaRPr lang="en-US"/>
           </a:p>
@@ -983,7 +988,7 @@
           <a:p>
             <a:fld id="{25FCA107-4A46-354A-A02E-D5DEC74A159E}" type="datetimeFigureOut">
               <a:rPr lang="en-US" smtClean="0"/>
-              <a:t>2/9/18</a:t>
+              <a:t>3/22/18</a:t>
             </a:fld>
             <a:endParaRPr lang="en-US"/>
           </a:p>
@@ -1210,7 +1215,7 @@
           <a:p>
             <a:fld id="{25FCA107-4A46-354A-A02E-D5DEC74A159E}" type="datetimeFigureOut">
               <a:rPr lang="en-US" smtClean="0"/>
-              <a:t>2/9/18</a:t>
+              <a:t>3/22/18</a:t>
             </a:fld>
             <a:endParaRPr lang="en-US"/>
           </a:p>
@@ -1572,7 +1577,7 @@
           <a:p>
             <a:fld id="{25FCA107-4A46-354A-A02E-D5DEC74A159E}" type="datetimeFigureOut">
               <a:rPr lang="en-US" smtClean="0"/>
-              <a:t>2/9/18</a:t>
+              <a:t>3/22/18</a:t>
             </a:fld>
             <a:endParaRPr lang="en-US"/>
           </a:p>
@@ -1685,7 +1690,7 @@
           <a:p>
             <a:fld id="{25FCA107-4A46-354A-A02E-D5DEC74A159E}" type="datetimeFigureOut">
               <a:rPr lang="en-US" smtClean="0"/>
-              <a:t>2/9/18</a:t>
+              <a:t>3/22/18</a:t>
             </a:fld>
             <a:endParaRPr lang="en-US"/>
           </a:p>
@@ -1775,7 +1780,7 @@
           <a:p>
             <a:fld id="{25FCA107-4A46-354A-A02E-D5DEC74A159E}" type="datetimeFigureOut">
               <a:rPr lang="en-US" smtClean="0"/>
-              <a:t>2/9/18</a:t>
+              <a:t>3/22/18</a:t>
             </a:fld>
             <a:endParaRPr lang="en-US"/>
           </a:p>
@@ -2047,7 +2052,7 @@
           <a:p>
             <a:fld id="{25FCA107-4A46-354A-A02E-D5DEC74A159E}" type="datetimeFigureOut">
               <a:rPr lang="en-US" smtClean="0"/>
-              <a:t>2/9/18</a:t>
+              <a:t>3/22/18</a:t>
             </a:fld>
             <a:endParaRPr lang="en-US"/>
           </a:p>
@@ -2299,7 +2304,7 @@
           <a:p>
             <a:fld id="{25FCA107-4A46-354A-A02E-D5DEC74A159E}" type="datetimeFigureOut">
               <a:rPr lang="en-US" smtClean="0"/>
-              <a:t>2/9/18</a:t>
+              <a:t>3/22/18</a:t>
             </a:fld>
             <a:endParaRPr lang="en-US"/>
           </a:p>
@@ -2507,7 +2512,7 @@
           <a:p>
             <a:fld id="{25FCA107-4A46-354A-A02E-D5DEC74A159E}" type="datetimeFigureOut">
               <a:rPr lang="en-US" smtClean="0"/>
-              <a:t>2/9/18</a:t>
+              <a:t>3/22/18</a:t>
             </a:fld>
             <a:endParaRPr lang="en-US"/>
           </a:p>
@@ -2998,7 +3003,7 @@
             <p:ph idx="1"/>
             <p:extLst>
               <p:ext uri="{D42A27DB-BD31-4B8C-83A1-F6EECF244321}">
-                <p14:modId xmlns:p14="http://schemas.microsoft.com/office/powerpoint/2010/main" val="138353142"/>
+                <p14:modId xmlns:p14="http://schemas.microsoft.com/office/powerpoint/2010/main" val="46635433"/>
               </p:ext>
             </p:extLst>
           </p:nvPr>
@@ -3575,8 +3580,13 @@
                       <a:pPr algn="ctr"/>
                       <a:r>
                         <a:rPr lang="en-US" sz="1400" baseline="0" dirty="0" smtClean="0"/>
-                        <a:t>ox2902</a:t>
-                      </a:r>
+                        <a:t>0</a:t>
+                      </a:r>
+                      <a:r>
+                        <a:rPr lang="en-US" sz="1400" baseline="0" smtClean="0"/>
+                        <a:t>x2902</a:t>
+                      </a:r>
+                      <a:endParaRPr lang="en-US" sz="1400" baseline="0" dirty="0" smtClean="0"/>
                     </a:p>
                     <a:p>
                       <a:pPr algn="ctr"/>

</xml_diff>